<commit_message>
completed the provider powerpoint
</commit_message>
<xml_diff>
--- a/PowerPoints/Phase 2 - Overview/006 An Overview of Provider Data.pptx
+++ b/PowerPoints/Phase 2 - Overview/006 An Overview of Provider Data.pptx
@@ -111,6 +111,22 @@
       </a:defRPr>
     </a:lvl9pPr>
   </p:defaultTextStyle>
+  <p:extLst>
+    <p:ext uri="{EFAFB233-063F-42B5-8137-9DF3F51BA10A}">
+      <p15:sldGuideLst xmlns:p15="http://schemas.microsoft.com/office/powerpoint/2012/main">
+        <p15:guide id="1" orient="horz" pos="2160">
+          <p15:clr>
+            <a:srgbClr val="A4A3A4"/>
+          </p15:clr>
+        </p15:guide>
+        <p15:guide id="2" pos="3840">
+          <p15:clr>
+            <a:srgbClr val="A4A3A4"/>
+          </p15:clr>
+        </p15:guide>
+      </p15:sldGuideLst>
+    </p:ext>
+  </p:extLst>
 </p:presentation>
 </file>
 
@@ -158,7 +174,7 @@
           </a:lstStyle>
           <a:p>
             <a:r>
-              <a:rPr lang="en-US" smtClean="0"/>
+              <a:rPr lang="en-US"/>
               <a:t>Click to edit Master title style</a:t>
             </a:r>
             <a:endParaRPr lang="en-US" dirty="0"/>
@@ -232,7 +248,7 @@
           </a:lstStyle>
           <a:p>
             <a:r>
-              <a:rPr lang="en-US" smtClean="0"/>
+              <a:rPr lang="en-US"/>
               <a:t>Click to edit Master subtitle style</a:t>
             </a:r>
             <a:endParaRPr lang="en-US" dirty="0"/>
@@ -256,7 +272,7 @@
           <a:p>
             <a:fld id="{FF632088-7E42-4B13-8645-6CA4616862AF}" type="datetimeFigureOut">
               <a:rPr lang="en-US" smtClean="0"/>
-              <a:t>2/23/2016</a:t>
+              <a:t>2/28/2016</a:t>
             </a:fld>
             <a:endParaRPr lang="en-US"/>
           </a:p>
@@ -350,10 +366,9 @@
           <a:lstStyle/>
           <a:p>
             <a:r>
-              <a:rPr lang="en-US" smtClean="0"/>
+              <a:rPr lang="en-US"/>
               <a:t>Click to edit Master title style</a:t>
             </a:r>
-            <a:endParaRPr lang="en-US"/>
           </a:p>
         </p:txBody>
       </p:sp>
@@ -374,35 +389,35 @@
           <a:p>
             <a:pPr lvl="0"/>
             <a:r>
-              <a:rPr lang="en-US" smtClean="0"/>
+              <a:rPr lang="en-US"/>
               <a:t>Edit Master text styles</a:t>
             </a:r>
           </a:p>
           <a:p>
             <a:pPr lvl="1"/>
             <a:r>
-              <a:rPr lang="en-US" smtClean="0"/>
+              <a:rPr lang="en-US"/>
               <a:t>Second level</a:t>
             </a:r>
           </a:p>
           <a:p>
             <a:pPr lvl="2"/>
             <a:r>
-              <a:rPr lang="en-US" smtClean="0"/>
+              <a:rPr lang="en-US"/>
               <a:t>Third level</a:t>
             </a:r>
           </a:p>
           <a:p>
             <a:pPr lvl="3"/>
             <a:r>
-              <a:rPr lang="en-US" smtClean="0"/>
+              <a:rPr lang="en-US"/>
               <a:t>Fourth level</a:t>
             </a:r>
           </a:p>
           <a:p>
             <a:pPr lvl="4"/>
             <a:r>
-              <a:rPr lang="en-US" smtClean="0"/>
+              <a:rPr lang="en-US"/>
               <a:t>Fifth level</a:t>
             </a:r>
             <a:endParaRPr lang="en-US" dirty="0"/>
@@ -426,7 +441,7 @@
           <a:p>
             <a:fld id="{FF632088-7E42-4B13-8645-6CA4616862AF}" type="datetimeFigureOut">
               <a:rPr lang="en-US" smtClean="0"/>
-              <a:t>2/23/2016</a:t>
+              <a:t>2/28/2016</a:t>
             </a:fld>
             <a:endParaRPr lang="en-US"/>
           </a:p>
@@ -525,10 +540,9 @@
           <a:lstStyle/>
           <a:p>
             <a:r>
-              <a:rPr lang="en-US" smtClean="0"/>
+              <a:rPr lang="en-US"/>
               <a:t>Click to edit Master title style</a:t>
             </a:r>
-            <a:endParaRPr lang="en-US"/>
           </a:p>
         </p:txBody>
       </p:sp>
@@ -554,38 +568,37 @@
           <a:p>
             <a:pPr lvl="0"/>
             <a:r>
-              <a:rPr lang="en-US" smtClean="0"/>
+              <a:rPr lang="en-US"/>
               <a:t>Edit Master text styles</a:t>
             </a:r>
           </a:p>
           <a:p>
             <a:pPr lvl="1"/>
             <a:r>
-              <a:rPr lang="en-US" smtClean="0"/>
+              <a:rPr lang="en-US"/>
               <a:t>Second level</a:t>
             </a:r>
           </a:p>
           <a:p>
             <a:pPr lvl="2"/>
             <a:r>
-              <a:rPr lang="en-US" smtClean="0"/>
+              <a:rPr lang="en-US"/>
               <a:t>Third level</a:t>
             </a:r>
           </a:p>
           <a:p>
             <a:pPr lvl="3"/>
             <a:r>
-              <a:rPr lang="en-US" smtClean="0"/>
+              <a:rPr lang="en-US"/>
               <a:t>Fourth level</a:t>
             </a:r>
           </a:p>
           <a:p>
             <a:pPr lvl="4"/>
             <a:r>
-              <a:rPr lang="en-US" smtClean="0"/>
+              <a:rPr lang="en-US"/>
               <a:t>Fifth level</a:t>
             </a:r>
-            <a:endParaRPr lang="en-US"/>
           </a:p>
         </p:txBody>
       </p:sp>
@@ -606,7 +619,7 @@
           <a:p>
             <a:fld id="{FF632088-7E42-4B13-8645-6CA4616862AF}" type="datetimeFigureOut">
               <a:rPr lang="en-US" smtClean="0"/>
-              <a:t>2/23/2016</a:t>
+              <a:t>2/28/2016</a:t>
             </a:fld>
             <a:endParaRPr lang="en-US"/>
           </a:p>
@@ -711,7 +724,7 @@
           </a:lstStyle>
           <a:p>
             <a:r>
-              <a:rPr lang="en-US" smtClean="0"/>
+              <a:rPr lang="en-US"/>
               <a:t>Click to edit Master title style</a:t>
             </a:r>
             <a:endParaRPr lang="en-US" dirty="0"/>
@@ -782,7 +795,7 @@
           </a:lstStyle>
           <a:p>
             <a:r>
-              <a:rPr lang="en-US" smtClean="0"/>
+              <a:rPr lang="en-US"/>
               <a:t>Click to edit Master subtitle style</a:t>
             </a:r>
             <a:endParaRPr lang="en-US" dirty="0"/>
@@ -806,7 +819,7 @@
           <a:p>
             <a:fld id="{FF632088-7E42-4B13-8645-6CA4616862AF}" type="datetimeFigureOut">
               <a:rPr lang="en-US" smtClean="0"/>
-              <a:t>2/23/2016</a:t>
+              <a:t>2/28/2016</a:t>
             </a:fld>
             <a:endParaRPr lang="en-US"/>
           </a:p>
@@ -947,7 +960,7 @@
           <a:lstStyle/>
           <a:p>
             <a:r>
-              <a:rPr lang="en-US" smtClean="0"/>
+              <a:rPr lang="en-US"/>
               <a:t>Click to edit Master title style</a:t>
             </a:r>
             <a:endParaRPr lang="en-US" dirty="0"/>
@@ -971,35 +984,35 @@
           <a:p>
             <a:pPr lvl="0"/>
             <a:r>
-              <a:rPr lang="en-US" smtClean="0"/>
+              <a:rPr lang="en-US"/>
               <a:t>Edit Master text styles</a:t>
             </a:r>
           </a:p>
           <a:p>
             <a:pPr lvl="1"/>
             <a:r>
-              <a:rPr lang="en-US" smtClean="0"/>
+              <a:rPr lang="en-US"/>
               <a:t>Second level</a:t>
             </a:r>
           </a:p>
           <a:p>
             <a:pPr lvl="2"/>
             <a:r>
-              <a:rPr lang="en-US" smtClean="0"/>
+              <a:rPr lang="en-US"/>
               <a:t>Third level</a:t>
             </a:r>
           </a:p>
           <a:p>
             <a:pPr lvl="3"/>
             <a:r>
-              <a:rPr lang="en-US" smtClean="0"/>
+              <a:rPr lang="en-US"/>
               <a:t>Fourth level</a:t>
             </a:r>
           </a:p>
           <a:p>
             <a:pPr lvl="4"/>
             <a:r>
-              <a:rPr lang="en-US" smtClean="0"/>
+              <a:rPr lang="en-US"/>
               <a:t>Fifth level</a:t>
             </a:r>
             <a:endParaRPr lang="en-US" dirty="0"/>
@@ -1023,7 +1036,7 @@
           <a:p>
             <a:fld id="{FF632088-7E42-4B13-8645-6CA4616862AF}" type="datetimeFigureOut">
               <a:rPr lang="en-US" smtClean="0"/>
-              <a:t>2/23/2016</a:t>
+              <a:t>2/28/2016</a:t>
             </a:fld>
             <a:endParaRPr lang="en-US"/>
           </a:p>
@@ -1165,7 +1178,7 @@
           </a:lstStyle>
           <a:p>
             <a:r>
-              <a:rPr lang="en-US" smtClean="0"/>
+              <a:rPr lang="en-US"/>
               <a:t>Click to edit Master title style</a:t>
             </a:r>
             <a:endParaRPr lang="en-US" dirty="0"/>
@@ -1285,7 +1298,7 @@
           <a:p>
             <a:pPr lvl="0"/>
             <a:r>
-              <a:rPr lang="en-US" smtClean="0"/>
+              <a:rPr lang="en-US"/>
               <a:t>Edit Master text styles</a:t>
             </a:r>
           </a:p>
@@ -1308,7 +1321,7 @@
           <a:p>
             <a:fld id="{FF632088-7E42-4B13-8645-6CA4616862AF}" type="datetimeFigureOut">
               <a:rPr lang="en-US" smtClean="0"/>
-              <a:t>2/23/2016</a:t>
+              <a:t>2/28/2016</a:t>
             </a:fld>
             <a:endParaRPr lang="en-US"/>
           </a:p>
@@ -1444,7 +1457,7 @@
           <a:lstStyle/>
           <a:p>
             <a:r>
-              <a:rPr lang="en-US" smtClean="0"/>
+              <a:rPr lang="en-US"/>
               <a:t>Click to edit Master title style</a:t>
             </a:r>
             <a:endParaRPr lang="en-US" dirty="0"/>
@@ -1473,35 +1486,35 @@
           <a:p>
             <a:pPr lvl="0"/>
             <a:r>
-              <a:rPr lang="en-US" smtClean="0"/>
+              <a:rPr lang="en-US"/>
               <a:t>Edit Master text styles</a:t>
             </a:r>
           </a:p>
           <a:p>
             <a:pPr lvl="1"/>
             <a:r>
-              <a:rPr lang="en-US" smtClean="0"/>
+              <a:rPr lang="en-US"/>
               <a:t>Second level</a:t>
             </a:r>
           </a:p>
           <a:p>
             <a:pPr lvl="2"/>
             <a:r>
-              <a:rPr lang="en-US" smtClean="0"/>
+              <a:rPr lang="en-US"/>
               <a:t>Third level</a:t>
             </a:r>
           </a:p>
           <a:p>
             <a:pPr lvl="3"/>
             <a:r>
-              <a:rPr lang="en-US" smtClean="0"/>
+              <a:rPr lang="en-US"/>
               <a:t>Fourth level</a:t>
             </a:r>
           </a:p>
           <a:p>
             <a:pPr lvl="4"/>
             <a:r>
-              <a:rPr lang="en-US" smtClean="0"/>
+              <a:rPr lang="en-US"/>
               <a:t>Fifth level</a:t>
             </a:r>
             <a:endParaRPr lang="en-US" dirty="0"/>
@@ -1530,35 +1543,35 @@
           <a:p>
             <a:pPr lvl="0"/>
             <a:r>
-              <a:rPr lang="en-US" smtClean="0"/>
+              <a:rPr lang="en-US"/>
               <a:t>Edit Master text styles</a:t>
             </a:r>
           </a:p>
           <a:p>
             <a:pPr lvl="1"/>
             <a:r>
-              <a:rPr lang="en-US" smtClean="0"/>
+              <a:rPr lang="en-US"/>
               <a:t>Second level</a:t>
             </a:r>
           </a:p>
           <a:p>
             <a:pPr lvl="2"/>
             <a:r>
-              <a:rPr lang="en-US" smtClean="0"/>
+              <a:rPr lang="en-US"/>
               <a:t>Third level</a:t>
             </a:r>
           </a:p>
           <a:p>
             <a:pPr lvl="3"/>
             <a:r>
-              <a:rPr lang="en-US" smtClean="0"/>
+              <a:rPr lang="en-US"/>
               <a:t>Fourth level</a:t>
             </a:r>
           </a:p>
           <a:p>
             <a:pPr lvl="4"/>
             <a:r>
-              <a:rPr lang="en-US" smtClean="0"/>
+              <a:rPr lang="en-US"/>
               <a:t>Fifth level</a:t>
             </a:r>
             <a:endParaRPr lang="en-US" dirty="0"/>
@@ -1582,7 +1595,7 @@
           <a:p>
             <a:fld id="{FF632088-7E42-4B13-8645-6CA4616862AF}" type="datetimeFigureOut">
               <a:rPr lang="en-US" smtClean="0"/>
-              <a:t>2/23/2016</a:t>
+              <a:t>2/28/2016</a:t>
             </a:fld>
             <a:endParaRPr lang="en-US"/>
           </a:p>
@@ -1679,7 +1692,7 @@
   </p:clrMapOvr>
   <p:extLst>
     <p:ext uri="{DCECCB84-F9BA-43D5-87BE-67443E8EF086}">
-      <p15:sldGuideLst xmlns="" xmlns:p15="http://schemas.microsoft.com/office/powerpoint/2012/main"/>
+      <p15:sldGuideLst xmlns:p15="http://schemas.microsoft.com/office/powerpoint/2012/main"/>
     </p:ext>
   </p:extLst>
 </p:sldLayout>
@@ -1723,7 +1736,7 @@
           <a:lstStyle/>
           <a:p>
             <a:r>
-              <a:rPr lang="en-US" smtClean="0"/>
+              <a:rPr lang="en-US"/>
               <a:t>Click to edit Master title style</a:t>
             </a:r>
             <a:endParaRPr lang="en-US" dirty="0"/>
@@ -1798,7 +1811,7 @@
           <a:p>
             <a:pPr lvl="0"/>
             <a:r>
-              <a:rPr lang="en-US" smtClean="0"/>
+              <a:rPr lang="en-US"/>
               <a:t>Edit Master text styles</a:t>
             </a:r>
           </a:p>
@@ -1826,35 +1839,35 @@
           <a:p>
             <a:pPr lvl="0"/>
             <a:r>
-              <a:rPr lang="en-US" smtClean="0"/>
+              <a:rPr lang="en-US"/>
               <a:t>Edit Master text styles</a:t>
             </a:r>
           </a:p>
           <a:p>
             <a:pPr lvl="1"/>
             <a:r>
-              <a:rPr lang="en-US" smtClean="0"/>
+              <a:rPr lang="en-US"/>
               <a:t>Second level</a:t>
             </a:r>
           </a:p>
           <a:p>
             <a:pPr lvl="2"/>
             <a:r>
-              <a:rPr lang="en-US" smtClean="0"/>
+              <a:rPr lang="en-US"/>
               <a:t>Third level</a:t>
             </a:r>
           </a:p>
           <a:p>
             <a:pPr lvl="3"/>
             <a:r>
-              <a:rPr lang="en-US" smtClean="0"/>
+              <a:rPr lang="en-US"/>
               <a:t>Fourth level</a:t>
             </a:r>
           </a:p>
           <a:p>
             <a:pPr lvl="4"/>
             <a:r>
-              <a:rPr lang="en-US" smtClean="0"/>
+              <a:rPr lang="en-US"/>
               <a:t>Fifth level</a:t>
             </a:r>
             <a:endParaRPr lang="en-US" dirty="0"/>
@@ -1929,7 +1942,7 @@
           <a:p>
             <a:pPr lvl="0"/>
             <a:r>
-              <a:rPr lang="en-US" smtClean="0"/>
+              <a:rPr lang="en-US"/>
               <a:t>Edit Master text styles</a:t>
             </a:r>
           </a:p>
@@ -1957,35 +1970,35 @@
           <a:p>
             <a:pPr lvl="0"/>
             <a:r>
-              <a:rPr lang="en-US" smtClean="0"/>
+              <a:rPr lang="en-US"/>
               <a:t>Edit Master text styles</a:t>
             </a:r>
           </a:p>
           <a:p>
             <a:pPr lvl="1"/>
             <a:r>
-              <a:rPr lang="en-US" smtClean="0"/>
+              <a:rPr lang="en-US"/>
               <a:t>Second level</a:t>
             </a:r>
           </a:p>
           <a:p>
             <a:pPr lvl="2"/>
             <a:r>
-              <a:rPr lang="en-US" smtClean="0"/>
+              <a:rPr lang="en-US"/>
               <a:t>Third level</a:t>
             </a:r>
           </a:p>
           <a:p>
             <a:pPr lvl="3"/>
             <a:r>
-              <a:rPr lang="en-US" smtClean="0"/>
+              <a:rPr lang="en-US"/>
               <a:t>Fourth level</a:t>
             </a:r>
           </a:p>
           <a:p>
             <a:pPr lvl="4"/>
             <a:r>
-              <a:rPr lang="en-US" smtClean="0"/>
+              <a:rPr lang="en-US"/>
               <a:t>Fifth level</a:t>
             </a:r>
             <a:endParaRPr lang="en-US" dirty="0"/>
@@ -2009,7 +2022,7 @@
           <a:p>
             <a:fld id="{FF632088-7E42-4B13-8645-6CA4616862AF}" type="datetimeFigureOut">
               <a:rPr lang="en-US" smtClean="0"/>
-              <a:t>2/23/2016</a:t>
+              <a:t>2/28/2016</a:t>
             </a:fld>
             <a:endParaRPr lang="en-US"/>
           </a:p>
@@ -2106,7 +2119,7 @@
   </p:clrMapOvr>
   <p:extLst>
     <p:ext uri="{DCECCB84-F9BA-43D5-87BE-67443E8EF086}">
-      <p15:sldGuideLst xmlns="" xmlns:p15="http://schemas.microsoft.com/office/powerpoint/2012/main"/>
+      <p15:sldGuideLst xmlns:p15="http://schemas.microsoft.com/office/powerpoint/2012/main"/>
     </p:ext>
   </p:extLst>
 </p:sldLayout>
@@ -2145,7 +2158,7 @@
           <a:lstStyle/>
           <a:p>
             <a:r>
-              <a:rPr lang="en-US" smtClean="0"/>
+              <a:rPr lang="en-US"/>
               <a:t>Click to edit Master title style</a:t>
             </a:r>
             <a:endParaRPr lang="en-US" dirty="0"/>
@@ -2169,7 +2182,7 @@
           <a:p>
             <a:fld id="{FF632088-7E42-4B13-8645-6CA4616862AF}" type="datetimeFigureOut">
               <a:rPr lang="en-US" smtClean="0"/>
-              <a:t>2/23/2016</a:t>
+              <a:t>2/28/2016</a:t>
             </a:fld>
             <a:endParaRPr lang="en-US"/>
           </a:p>
@@ -2301,7 +2314,7 @@
           <a:p>
             <a:fld id="{FF632088-7E42-4B13-8645-6CA4616862AF}" type="datetimeFigureOut">
               <a:rPr lang="en-US" smtClean="0"/>
-              <a:t>2/23/2016</a:t>
+              <a:t>2/28/2016</a:t>
             </a:fld>
             <a:endParaRPr lang="en-US"/>
           </a:p>
@@ -2406,7 +2419,7 @@
           </a:lstStyle>
           <a:p>
             <a:r>
-              <a:rPr lang="en-US" smtClean="0"/>
+              <a:rPr lang="en-US"/>
               <a:t>Click to edit Master title style</a:t>
             </a:r>
             <a:endParaRPr lang="en-US" dirty="0"/>
@@ -2435,35 +2448,35 @@
           <a:p>
             <a:pPr lvl="0"/>
             <a:r>
-              <a:rPr lang="en-US" smtClean="0"/>
+              <a:rPr lang="en-US"/>
               <a:t>Edit Master text styles</a:t>
             </a:r>
           </a:p>
           <a:p>
             <a:pPr lvl="1"/>
             <a:r>
-              <a:rPr lang="en-US" smtClean="0"/>
+              <a:rPr lang="en-US"/>
               <a:t>Second level</a:t>
             </a:r>
           </a:p>
           <a:p>
             <a:pPr lvl="2"/>
             <a:r>
-              <a:rPr lang="en-US" smtClean="0"/>
+              <a:rPr lang="en-US"/>
               <a:t>Third level</a:t>
             </a:r>
           </a:p>
           <a:p>
             <a:pPr lvl="3"/>
             <a:r>
-              <a:rPr lang="en-US" smtClean="0"/>
+              <a:rPr lang="en-US"/>
               <a:t>Fourth level</a:t>
             </a:r>
           </a:p>
           <a:p>
             <a:pPr lvl="4"/>
             <a:r>
-              <a:rPr lang="en-US" smtClean="0"/>
+              <a:rPr lang="en-US"/>
               <a:t>Fifth level</a:t>
             </a:r>
             <a:endParaRPr lang="en-US" dirty="0"/>
@@ -2529,7 +2542,7 @@
           <a:p>
             <a:pPr lvl="0"/>
             <a:r>
-              <a:rPr lang="en-US" smtClean="0"/>
+              <a:rPr lang="en-US"/>
               <a:t>Edit Master text styles</a:t>
             </a:r>
           </a:p>
@@ -2552,7 +2565,7 @@
           <a:p>
             <a:fld id="{FF632088-7E42-4B13-8645-6CA4616862AF}" type="datetimeFigureOut">
               <a:rPr lang="en-US" smtClean="0"/>
-              <a:t>2/23/2016</a:t>
+              <a:t>2/28/2016</a:t>
             </a:fld>
             <a:endParaRPr lang="en-US"/>
           </a:p>
@@ -2649,7 +2662,7 @@
   </p:clrMapOvr>
   <p:extLst>
     <p:ext uri="{DCECCB84-F9BA-43D5-87BE-67443E8EF086}">
-      <p15:sldGuideLst xmlns="" xmlns:p15="http://schemas.microsoft.com/office/powerpoint/2012/main"/>
+      <p15:sldGuideLst xmlns:p15="http://schemas.microsoft.com/office/powerpoint/2012/main"/>
     </p:ext>
   </p:extLst>
 </p:sldLayout>
@@ -2688,7 +2701,7 @@
           <a:lstStyle/>
           <a:p>
             <a:r>
-              <a:rPr lang="en-US" smtClean="0"/>
+              <a:rPr lang="en-US"/>
               <a:t>Click to edit Master title style</a:t>
             </a:r>
             <a:endParaRPr lang="en-US" dirty="0"/>
@@ -2712,35 +2725,35 @@
           <a:p>
             <a:pPr lvl="0"/>
             <a:r>
-              <a:rPr lang="en-US" smtClean="0"/>
+              <a:rPr lang="en-US"/>
               <a:t>Edit Master text styles</a:t>
             </a:r>
           </a:p>
           <a:p>
             <a:pPr lvl="1"/>
             <a:r>
-              <a:rPr lang="en-US" smtClean="0"/>
+              <a:rPr lang="en-US"/>
               <a:t>Second level</a:t>
             </a:r>
           </a:p>
           <a:p>
             <a:pPr lvl="2"/>
             <a:r>
-              <a:rPr lang="en-US" smtClean="0"/>
+              <a:rPr lang="en-US"/>
               <a:t>Third level</a:t>
             </a:r>
           </a:p>
           <a:p>
             <a:pPr lvl="3"/>
             <a:r>
-              <a:rPr lang="en-US" smtClean="0"/>
+              <a:rPr lang="en-US"/>
               <a:t>Fourth level</a:t>
             </a:r>
           </a:p>
           <a:p>
             <a:pPr lvl="4"/>
             <a:r>
-              <a:rPr lang="en-US" smtClean="0"/>
+              <a:rPr lang="en-US"/>
               <a:t>Fifth level</a:t>
             </a:r>
             <a:endParaRPr lang="en-US" dirty="0"/>
@@ -2764,7 +2777,7 @@
           <a:p>
             <a:fld id="{FF632088-7E42-4B13-8645-6CA4616862AF}" type="datetimeFigureOut">
               <a:rPr lang="en-US" smtClean="0"/>
-              <a:t>2/23/2016</a:t>
+              <a:t>2/28/2016</a:t>
             </a:fld>
             <a:endParaRPr lang="en-US"/>
           </a:p>
@@ -3007,7 +3020,7 @@
           </a:lstStyle>
           <a:p>
             <a:r>
-              <a:rPr lang="en-US" smtClean="0"/>
+              <a:rPr lang="en-US"/>
               <a:t>Click to edit Master title style</a:t>
             </a:r>
             <a:endParaRPr lang="en-US" dirty="0"/>
@@ -3082,7 +3095,7 @@
           </a:lstStyle>
           <a:p>
             <a:r>
-              <a:rPr lang="en-US" smtClean="0"/>
+              <a:rPr lang="en-US"/>
               <a:t>Click icon to add picture</a:t>
             </a:r>
             <a:endParaRPr lang="en-US" dirty="0"/>
@@ -3150,7 +3163,7 @@
           <a:p>
             <a:pPr lvl="0"/>
             <a:r>
-              <a:rPr lang="en-US" smtClean="0"/>
+              <a:rPr lang="en-US"/>
               <a:t>Edit Master text styles</a:t>
             </a:r>
           </a:p>
@@ -3182,7 +3195,7 @@
           <a:p>
             <a:fld id="{FF632088-7E42-4B13-8645-6CA4616862AF}" type="datetimeFigureOut">
               <a:rPr lang="en-US" smtClean="0"/>
-              <a:t>2/23/2016</a:t>
+              <a:t>2/28/2016</a:t>
             </a:fld>
             <a:endParaRPr lang="en-US"/>
           </a:p>
@@ -3318,7 +3331,7 @@
           <a:lstStyle/>
           <a:p>
             <a:r>
-              <a:rPr lang="en-US" smtClean="0"/>
+              <a:rPr lang="en-US"/>
               <a:t>Click to edit Master title style</a:t>
             </a:r>
             <a:endParaRPr lang="en-US" dirty="0"/>
@@ -3342,35 +3355,35 @@
           <a:p>
             <a:pPr lvl="0"/>
             <a:r>
-              <a:rPr lang="en-US" smtClean="0"/>
+              <a:rPr lang="en-US"/>
               <a:t>Edit Master text styles</a:t>
             </a:r>
           </a:p>
           <a:p>
             <a:pPr lvl="1"/>
             <a:r>
-              <a:rPr lang="en-US" smtClean="0"/>
+              <a:rPr lang="en-US"/>
               <a:t>Second level</a:t>
             </a:r>
           </a:p>
           <a:p>
             <a:pPr lvl="2"/>
             <a:r>
-              <a:rPr lang="en-US" smtClean="0"/>
+              <a:rPr lang="en-US"/>
               <a:t>Third level</a:t>
             </a:r>
           </a:p>
           <a:p>
             <a:pPr lvl="3"/>
             <a:r>
-              <a:rPr lang="en-US" smtClean="0"/>
+              <a:rPr lang="en-US"/>
               <a:t>Fourth level</a:t>
             </a:r>
           </a:p>
           <a:p>
             <a:pPr lvl="4"/>
             <a:r>
-              <a:rPr lang="en-US" smtClean="0"/>
+              <a:rPr lang="en-US"/>
               <a:t>Fifth level</a:t>
             </a:r>
             <a:endParaRPr lang="en-US" dirty="0"/>
@@ -3394,7 +3407,7 @@
           <a:p>
             <a:fld id="{FF632088-7E42-4B13-8645-6CA4616862AF}" type="datetimeFigureOut">
               <a:rPr lang="en-US" smtClean="0"/>
-              <a:t>2/23/2016</a:t>
+              <a:t>2/28/2016</a:t>
             </a:fld>
             <a:endParaRPr lang="en-US"/>
           </a:p>
@@ -3534,7 +3547,7 @@
           </a:lstStyle>
           <a:p>
             <a:r>
-              <a:rPr lang="en-US" smtClean="0"/>
+              <a:rPr lang="en-US"/>
               <a:t>Click to edit Master title style</a:t>
             </a:r>
             <a:endParaRPr lang="en-US" dirty="0"/>
@@ -3563,35 +3576,35 @@
           <a:p>
             <a:pPr lvl="0"/>
             <a:r>
-              <a:rPr lang="en-US" smtClean="0"/>
+              <a:rPr lang="en-US"/>
               <a:t>Edit Master text styles</a:t>
             </a:r>
           </a:p>
           <a:p>
             <a:pPr lvl="1"/>
             <a:r>
-              <a:rPr lang="en-US" smtClean="0"/>
+              <a:rPr lang="en-US"/>
               <a:t>Second level</a:t>
             </a:r>
           </a:p>
           <a:p>
             <a:pPr lvl="2"/>
             <a:r>
-              <a:rPr lang="en-US" smtClean="0"/>
+              <a:rPr lang="en-US"/>
               <a:t>Third level</a:t>
             </a:r>
           </a:p>
           <a:p>
             <a:pPr lvl="3"/>
             <a:r>
-              <a:rPr lang="en-US" smtClean="0"/>
+              <a:rPr lang="en-US"/>
               <a:t>Fourth level</a:t>
             </a:r>
           </a:p>
           <a:p>
             <a:pPr lvl="4"/>
             <a:r>
-              <a:rPr lang="en-US" smtClean="0"/>
+              <a:rPr lang="en-US"/>
               <a:t>Fifth level</a:t>
             </a:r>
             <a:endParaRPr lang="en-US" dirty="0"/>
@@ -3615,7 +3628,7 @@
           <a:p>
             <a:fld id="{FF632088-7E42-4B13-8645-6CA4616862AF}" type="datetimeFigureOut">
               <a:rPr lang="en-US" smtClean="0"/>
-              <a:t>2/23/2016</a:t>
+              <a:t>2/28/2016</a:t>
             </a:fld>
             <a:endParaRPr lang="en-US"/>
           </a:p>
@@ -3757,7 +3770,7 @@
           </a:lstStyle>
           <a:p>
             <a:r>
-              <a:rPr lang="en-US" smtClean="0"/>
+              <a:rPr lang="en-US"/>
               <a:t>Click to edit Master title style</a:t>
             </a:r>
             <a:endParaRPr lang="en-US" dirty="0"/>
@@ -3880,7 +3893,7 @@
           <a:p>
             <a:pPr lvl="0"/>
             <a:r>
-              <a:rPr lang="en-US" smtClean="0"/>
+              <a:rPr lang="en-US"/>
               <a:t>Edit Master text styles</a:t>
             </a:r>
           </a:p>
@@ -3903,7 +3916,7 @@
           <a:p>
             <a:fld id="{FF632088-7E42-4B13-8645-6CA4616862AF}" type="datetimeFigureOut">
               <a:rPr lang="en-US" smtClean="0"/>
-              <a:t>2/23/2016</a:t>
+              <a:t>2/28/2016</a:t>
             </a:fld>
             <a:endParaRPr lang="en-US"/>
           </a:p>
@@ -3997,7 +4010,7 @@
           <a:lstStyle/>
           <a:p>
             <a:r>
-              <a:rPr lang="en-US" smtClean="0"/>
+              <a:rPr lang="en-US"/>
               <a:t>Click to edit Master title style</a:t>
             </a:r>
             <a:endParaRPr lang="en-US" dirty="0"/>
@@ -4026,35 +4039,35 @@
           <a:p>
             <a:pPr lvl="0"/>
             <a:r>
-              <a:rPr lang="en-US" smtClean="0"/>
+              <a:rPr lang="en-US"/>
               <a:t>Edit Master text styles</a:t>
             </a:r>
           </a:p>
           <a:p>
             <a:pPr lvl="1"/>
             <a:r>
-              <a:rPr lang="en-US" smtClean="0"/>
+              <a:rPr lang="en-US"/>
               <a:t>Second level</a:t>
             </a:r>
           </a:p>
           <a:p>
             <a:pPr lvl="2"/>
             <a:r>
-              <a:rPr lang="en-US" smtClean="0"/>
+              <a:rPr lang="en-US"/>
               <a:t>Third level</a:t>
             </a:r>
           </a:p>
           <a:p>
             <a:pPr lvl="3"/>
             <a:r>
-              <a:rPr lang="en-US" smtClean="0"/>
+              <a:rPr lang="en-US"/>
               <a:t>Fourth level</a:t>
             </a:r>
           </a:p>
           <a:p>
             <a:pPr lvl="4"/>
             <a:r>
-              <a:rPr lang="en-US" smtClean="0"/>
+              <a:rPr lang="en-US"/>
               <a:t>Fifth level</a:t>
             </a:r>
             <a:endParaRPr lang="en-US" dirty="0"/>
@@ -4083,35 +4096,35 @@
           <a:p>
             <a:pPr lvl="0"/>
             <a:r>
-              <a:rPr lang="en-US" smtClean="0"/>
+              <a:rPr lang="en-US"/>
               <a:t>Edit Master text styles</a:t>
             </a:r>
           </a:p>
           <a:p>
             <a:pPr lvl="1"/>
             <a:r>
-              <a:rPr lang="en-US" smtClean="0"/>
+              <a:rPr lang="en-US"/>
               <a:t>Second level</a:t>
             </a:r>
           </a:p>
           <a:p>
             <a:pPr lvl="2"/>
             <a:r>
-              <a:rPr lang="en-US" smtClean="0"/>
+              <a:rPr lang="en-US"/>
               <a:t>Third level</a:t>
             </a:r>
           </a:p>
           <a:p>
             <a:pPr lvl="3"/>
             <a:r>
-              <a:rPr lang="en-US" smtClean="0"/>
+              <a:rPr lang="en-US"/>
               <a:t>Fourth level</a:t>
             </a:r>
           </a:p>
           <a:p>
             <a:pPr lvl="4"/>
             <a:r>
-              <a:rPr lang="en-US" smtClean="0"/>
+              <a:rPr lang="en-US"/>
               <a:t>Fifth level</a:t>
             </a:r>
             <a:endParaRPr lang="en-US" dirty="0"/>
@@ -4135,7 +4148,7 @@
           <a:p>
             <a:fld id="{FF632088-7E42-4B13-8645-6CA4616862AF}" type="datetimeFigureOut">
               <a:rPr lang="en-US" smtClean="0"/>
-              <a:t>2/23/2016</a:t>
+              <a:t>2/28/2016</a:t>
             </a:fld>
             <a:endParaRPr lang="en-US"/>
           </a:p>
@@ -4195,7 +4208,7 @@
   </p:clrMapOvr>
   <p:extLst>
     <p:ext uri="{DCECCB84-F9BA-43D5-87BE-67443E8EF086}">
-      <p15:sldGuideLst xmlns="" xmlns:p15="http://schemas.microsoft.com/office/powerpoint/2012/main"/>
+      <p15:sldGuideLst xmlns:p15="http://schemas.microsoft.com/office/powerpoint/2012/main"/>
     </p:ext>
   </p:extLst>
 </p:sldLayout>
@@ -4282,7 +4295,7 @@
           <a:p>
             <a:pPr lvl="0"/>
             <a:r>
-              <a:rPr lang="en-US" smtClean="0"/>
+              <a:rPr lang="en-US"/>
               <a:t>Edit Master text styles</a:t>
             </a:r>
           </a:p>
@@ -4310,35 +4323,35 @@
           <a:p>
             <a:pPr lvl="0"/>
             <a:r>
-              <a:rPr lang="en-US" smtClean="0"/>
+              <a:rPr lang="en-US"/>
               <a:t>Edit Master text styles</a:t>
             </a:r>
           </a:p>
           <a:p>
             <a:pPr lvl="1"/>
             <a:r>
-              <a:rPr lang="en-US" smtClean="0"/>
+              <a:rPr lang="en-US"/>
               <a:t>Second level</a:t>
             </a:r>
           </a:p>
           <a:p>
             <a:pPr lvl="2"/>
             <a:r>
-              <a:rPr lang="en-US" smtClean="0"/>
+              <a:rPr lang="en-US"/>
               <a:t>Third level</a:t>
             </a:r>
           </a:p>
           <a:p>
             <a:pPr lvl="3"/>
             <a:r>
-              <a:rPr lang="en-US" smtClean="0"/>
+              <a:rPr lang="en-US"/>
               <a:t>Fourth level</a:t>
             </a:r>
           </a:p>
           <a:p>
             <a:pPr lvl="4"/>
             <a:r>
-              <a:rPr lang="en-US" smtClean="0"/>
+              <a:rPr lang="en-US"/>
               <a:t>Fifth level</a:t>
             </a:r>
             <a:endParaRPr lang="en-US" dirty="0"/>
@@ -4407,7 +4420,7 @@
           <a:p>
             <a:pPr lvl="0"/>
             <a:r>
-              <a:rPr lang="en-US" smtClean="0"/>
+              <a:rPr lang="en-US"/>
               <a:t>Edit Master text styles</a:t>
             </a:r>
           </a:p>
@@ -4435,38 +4448,37 @@
           <a:p>
             <a:pPr lvl="0"/>
             <a:r>
-              <a:rPr lang="en-US" smtClean="0"/>
+              <a:rPr lang="en-US"/>
               <a:t>Edit Master text styles</a:t>
             </a:r>
           </a:p>
           <a:p>
             <a:pPr lvl="1"/>
             <a:r>
-              <a:rPr lang="en-US" smtClean="0"/>
+              <a:rPr lang="en-US"/>
               <a:t>Second level</a:t>
             </a:r>
           </a:p>
           <a:p>
             <a:pPr lvl="2"/>
             <a:r>
-              <a:rPr lang="en-US" smtClean="0"/>
+              <a:rPr lang="en-US"/>
               <a:t>Third level</a:t>
             </a:r>
           </a:p>
           <a:p>
             <a:pPr lvl="3"/>
             <a:r>
-              <a:rPr lang="en-US" smtClean="0"/>
+              <a:rPr lang="en-US"/>
               <a:t>Fourth level</a:t>
             </a:r>
           </a:p>
           <a:p>
             <a:pPr lvl="4"/>
             <a:r>
-              <a:rPr lang="en-US" smtClean="0"/>
+              <a:rPr lang="en-US"/>
               <a:t>Fifth level</a:t>
             </a:r>
-            <a:endParaRPr lang="en-US"/>
           </a:p>
         </p:txBody>
       </p:sp>
@@ -4487,7 +4499,7 @@
           <a:p>
             <a:fld id="{FF632088-7E42-4B13-8645-6CA4616862AF}" type="datetimeFigureOut">
               <a:rPr lang="en-US" smtClean="0"/>
-              <a:t>2/23/2016</a:t>
+              <a:t>2/28/2016</a:t>
             </a:fld>
             <a:endParaRPr lang="en-US"/>
           </a:p>
@@ -4551,7 +4563,7 @@
           <a:lstStyle/>
           <a:p>
             <a:r>
-              <a:rPr lang="en-US" smtClean="0"/>
+              <a:rPr lang="en-US"/>
               <a:t>Click to edit Master title style</a:t>
             </a:r>
             <a:endParaRPr lang="en-US" dirty="0"/>
@@ -4570,7 +4582,7 @@
   </p:clrMapOvr>
   <p:extLst>
     <p:ext uri="{DCECCB84-F9BA-43D5-87BE-67443E8EF086}">
-      <p15:sldGuideLst xmlns="" xmlns:p15="http://schemas.microsoft.com/office/powerpoint/2012/main"/>
+      <p15:sldGuideLst xmlns:p15="http://schemas.microsoft.com/office/powerpoint/2012/main"/>
     </p:ext>
   </p:extLst>
 </p:sldLayout>
@@ -4610,7 +4622,7 @@
           <a:p>
             <a:fld id="{FF632088-7E42-4B13-8645-6CA4616862AF}" type="datetimeFigureOut">
               <a:rPr lang="en-US" smtClean="0"/>
-              <a:t>2/23/2016</a:t>
+              <a:t>2/28/2016</a:t>
             </a:fld>
             <a:endParaRPr lang="en-US"/>
           </a:p>
@@ -4674,10 +4686,9 @@
           <a:lstStyle/>
           <a:p>
             <a:r>
-              <a:rPr lang="en-US" smtClean="0"/>
+              <a:rPr lang="en-US"/>
               <a:t>Click to edit Master title style</a:t>
             </a:r>
-            <a:endParaRPr lang="en-US"/>
           </a:p>
         </p:txBody>
       </p:sp>
@@ -4728,7 +4739,7 @@
           <a:p>
             <a:fld id="{FF632088-7E42-4B13-8645-6CA4616862AF}" type="datetimeFigureOut">
               <a:rPr lang="en-US" smtClean="0"/>
-              <a:t>2/23/2016</a:t>
+              <a:t>2/28/2016</a:t>
             </a:fld>
             <a:endParaRPr lang="en-US"/>
           </a:p>
@@ -4833,7 +4844,7 @@
           </a:lstStyle>
           <a:p>
             <a:r>
-              <a:rPr lang="en-US" smtClean="0"/>
+              <a:rPr lang="en-US"/>
               <a:t>Click to edit Master title style</a:t>
             </a:r>
             <a:endParaRPr lang="en-US" dirty="0"/>
@@ -4890,35 +4901,35 @@
           <a:p>
             <a:pPr lvl="0"/>
             <a:r>
-              <a:rPr lang="en-US" smtClean="0"/>
+              <a:rPr lang="en-US"/>
               <a:t>Edit Master text styles</a:t>
             </a:r>
           </a:p>
           <a:p>
             <a:pPr lvl="1"/>
             <a:r>
-              <a:rPr lang="en-US" smtClean="0"/>
+              <a:rPr lang="en-US"/>
               <a:t>Second level</a:t>
             </a:r>
           </a:p>
           <a:p>
             <a:pPr lvl="2"/>
             <a:r>
-              <a:rPr lang="en-US" smtClean="0"/>
+              <a:rPr lang="en-US"/>
               <a:t>Third level</a:t>
             </a:r>
           </a:p>
           <a:p>
             <a:pPr lvl="3"/>
             <a:r>
-              <a:rPr lang="en-US" smtClean="0"/>
+              <a:rPr lang="en-US"/>
               <a:t>Fourth level</a:t>
             </a:r>
           </a:p>
           <a:p>
             <a:pPr lvl="4"/>
             <a:r>
-              <a:rPr lang="en-US" smtClean="0"/>
+              <a:rPr lang="en-US"/>
               <a:t>Fifth level</a:t>
             </a:r>
             <a:endParaRPr lang="en-US" dirty="0"/>
@@ -4989,7 +5000,7 @@
           <a:p>
             <a:pPr lvl="0"/>
             <a:r>
-              <a:rPr lang="en-US" smtClean="0"/>
+              <a:rPr lang="en-US"/>
               <a:t>Edit Master text styles</a:t>
             </a:r>
           </a:p>
@@ -5012,7 +5023,7 @@
           <a:p>
             <a:fld id="{FF632088-7E42-4B13-8645-6CA4616862AF}" type="datetimeFigureOut">
               <a:rPr lang="en-US" smtClean="0"/>
-              <a:t>2/23/2016</a:t>
+              <a:t>2/28/2016</a:t>
             </a:fld>
             <a:endParaRPr lang="en-US"/>
           </a:p>
@@ -5072,7 +5083,7 @@
   </p:clrMapOvr>
   <p:extLst>
     <p:ext uri="{DCECCB84-F9BA-43D5-87BE-67443E8EF086}">
-      <p15:sldGuideLst xmlns="" xmlns:p15="http://schemas.microsoft.com/office/powerpoint/2012/main"/>
+      <p15:sldGuideLst xmlns:p15="http://schemas.microsoft.com/office/powerpoint/2012/main"/>
     </p:ext>
   </p:extLst>
 </p:sldLayout>
@@ -5122,7 +5133,7 @@
           </a:lstStyle>
           <a:p>
             <a:r>
-              <a:rPr lang="en-US" smtClean="0"/>
+              <a:rPr lang="en-US"/>
               <a:t>Click to edit Master title style</a:t>
             </a:r>
             <a:endParaRPr lang="en-US" dirty="0"/>
@@ -5187,7 +5198,7 @@
           </a:lstStyle>
           <a:p>
             <a:r>
-              <a:rPr lang="en-US" smtClean="0"/>
+              <a:rPr lang="en-US"/>
               <a:t>Click icon to add picture</a:t>
             </a:r>
             <a:endParaRPr lang="en-US" dirty="0"/>
@@ -5258,7 +5269,7 @@
           <a:p>
             <a:pPr lvl="0"/>
             <a:r>
-              <a:rPr lang="en-US" smtClean="0"/>
+              <a:rPr lang="en-US"/>
               <a:t>Edit Master text styles</a:t>
             </a:r>
           </a:p>
@@ -5281,7 +5292,7 @@
           <a:p>
             <a:fld id="{FF632088-7E42-4B13-8645-6CA4616862AF}" type="datetimeFigureOut">
               <a:rPr lang="en-US" smtClean="0"/>
-              <a:t>2/23/2016</a:t>
+              <a:t>2/28/2016</a:t>
             </a:fld>
             <a:endParaRPr lang="en-US"/>
           </a:p>
@@ -5390,7 +5401,7 @@
           <a:lstStyle/>
           <a:p>
             <a:r>
-              <a:rPr lang="en-US" smtClean="0"/>
+              <a:rPr lang="en-US"/>
               <a:t>Click to edit Master title style</a:t>
             </a:r>
             <a:endParaRPr lang="en-US" dirty="0"/>
@@ -5424,35 +5435,35 @@
           <a:p>
             <a:pPr lvl="0"/>
             <a:r>
-              <a:rPr lang="en-US" smtClean="0"/>
+              <a:rPr lang="en-US"/>
               <a:t>Edit Master text styles</a:t>
             </a:r>
           </a:p>
           <a:p>
             <a:pPr lvl="1"/>
             <a:r>
-              <a:rPr lang="en-US" smtClean="0"/>
+              <a:rPr lang="en-US"/>
               <a:t>Second level</a:t>
             </a:r>
           </a:p>
           <a:p>
             <a:pPr lvl="2"/>
             <a:r>
-              <a:rPr lang="en-US" smtClean="0"/>
+              <a:rPr lang="en-US"/>
               <a:t>Third level</a:t>
             </a:r>
           </a:p>
           <a:p>
             <a:pPr lvl="3"/>
             <a:r>
-              <a:rPr lang="en-US" smtClean="0"/>
+              <a:rPr lang="en-US"/>
               <a:t>Fourth level</a:t>
             </a:r>
           </a:p>
           <a:p>
             <a:pPr lvl="4"/>
             <a:r>
-              <a:rPr lang="en-US" smtClean="0"/>
+              <a:rPr lang="en-US"/>
               <a:t>Fifth level</a:t>
             </a:r>
             <a:endParaRPr lang="en-US" dirty="0"/>
@@ -5495,7 +5506,7 @@
           <a:p>
             <a:fld id="{FF632088-7E42-4B13-8645-6CA4616862AF}" type="datetimeFigureOut">
               <a:rPr lang="en-US" smtClean="0"/>
-              <a:t>2/23/2016</a:t>
+              <a:t>2/28/2016</a:t>
             </a:fld>
             <a:endParaRPr lang="en-US"/>
           </a:p>
@@ -5871,7 +5882,7 @@
   </p:txStyles>
   <p:extLst>
     <p:ext uri="{27BBF7A9-308A-43DC-89C8-2F10F3537804}">
-      <p15:sldGuideLst xmlns="" xmlns:p15="http://schemas.microsoft.com/office/powerpoint/2012/main"/>
+      <p15:sldGuideLst xmlns:p15="http://schemas.microsoft.com/office/powerpoint/2012/main"/>
     </p:ext>
   </p:extLst>
 </p:sldMaster>
@@ -5997,7 +6008,7 @@
           <a:lstStyle/>
           <a:p>
             <a:r>
-              <a:rPr lang="en-US" smtClean="0"/>
+              <a:rPr lang="en-US"/>
               <a:t>Click to edit Master title style</a:t>
             </a:r>
             <a:endParaRPr lang="en-US" dirty="0"/>
@@ -6100,7 +6111,7 @@
           <a:p>
             <a:fld id="{FF632088-7E42-4B13-8645-6CA4616862AF}" type="datetimeFigureOut">
               <a:rPr lang="en-US" smtClean="0"/>
-              <a:t>2/23/2016</a:t>
+              <a:t>2/28/2016</a:t>
             </a:fld>
             <a:endParaRPr lang="en-US"/>
           </a:p>
@@ -6568,7 +6579,7 @@
   </p:txStyles>
   <p:extLst>
     <p:ext uri="{27BBF7A9-308A-43DC-89C8-2F10F3537804}">
-      <p15:sldGuideLst xmlns="" xmlns:p15="http://schemas.microsoft.com/office/powerpoint/2012/main"/>
+      <p15:sldGuideLst xmlns:p15="http://schemas.microsoft.com/office/powerpoint/2012/main"/>
     </p:ext>
   </p:extLst>
 </p:sldMaster>
@@ -6607,10 +6618,9 @@
           <a:lstStyle/>
           <a:p>
             <a:r>
-              <a:rPr lang="en-US" dirty="0" smtClean="0"/>
+              <a:rPr lang="en-US" dirty="0"/>
               <a:t>Provider Data</a:t>
             </a:r>
-            <a:endParaRPr lang="en-US" dirty="0"/>
           </a:p>
         </p:txBody>
       </p:sp>
@@ -6630,10 +6640,9 @@
           <a:lstStyle/>
           <a:p>
             <a:r>
-              <a:rPr lang="en-US" smtClean="0"/>
+              <a:rPr lang="en-US"/>
               <a:t>Spyridon Ganas</a:t>
             </a:r>
-            <a:endParaRPr lang="en-US"/>
           </a:p>
         </p:txBody>
       </p:sp>
@@ -6682,7 +6691,10 @@
           <a:bodyPr/>
           <a:lstStyle/>
           <a:p>
-            <a:endParaRPr lang="en-US"/>
+            <a:r>
+              <a:rPr lang="en-US" dirty="0"/>
+              <a:t>What are Providers?</a:t>
+            </a:r>
           </a:p>
         </p:txBody>
       </p:sp>
@@ -6696,10 +6708,73 @@
             <p:ph idx="1"/>
           </p:nvPr>
         </p:nvSpPr>
-        <p:spPr/>
-        <p:txBody>
-          <a:bodyPr/>
-          <a:lstStyle/>
+        <p:spPr>
+          <a:xfrm>
+            <a:off x="1534696" y="2015732"/>
+            <a:ext cx="9520158" cy="3877068"/>
+          </a:xfrm>
+        </p:spPr>
+        <p:txBody>
+          <a:bodyPr/>
+          <a:lstStyle/>
+          <a:p>
+            <a:r>
+              <a:rPr lang="en-US" dirty="0"/>
+              <a:t>A provider any person or organization that provides services to patients.</a:t>
+            </a:r>
+          </a:p>
+          <a:p>
+            <a:pPr lvl="1"/>
+            <a:r>
+              <a:rPr lang="en-US" dirty="0"/>
+              <a:t>Doctors Offices</a:t>
+            </a:r>
+          </a:p>
+          <a:p>
+            <a:pPr lvl="1"/>
+            <a:r>
+              <a:rPr lang="en-US" dirty="0"/>
+              <a:t>Labs</a:t>
+            </a:r>
+          </a:p>
+          <a:p>
+            <a:pPr lvl="1"/>
+            <a:r>
+              <a:rPr lang="en-US" dirty="0"/>
+              <a:t>Hospitals</a:t>
+            </a:r>
+          </a:p>
+          <a:p>
+            <a:r>
+              <a:rPr lang="en-US" dirty="0"/>
+              <a:t>A provider can also be a person or organization that submits claims for or provides business services to servicing provider.</a:t>
+            </a:r>
+          </a:p>
+          <a:p>
+            <a:pPr lvl="1"/>
+            <a:r>
+              <a:rPr lang="en-US" dirty="0"/>
+              <a:t>Third-party administrators</a:t>
+            </a:r>
+          </a:p>
+          <a:p>
+            <a:pPr lvl="1"/>
+            <a:r>
+              <a:rPr lang="en-US" dirty="0"/>
+              <a:t>Pharmacy benefit management organizations</a:t>
+            </a:r>
+          </a:p>
+          <a:p>
+            <a:pPr lvl="1"/>
+            <a:r>
+              <a:rPr lang="en-US" dirty="0"/>
+              <a:t>Behavioral health management organizations</a:t>
+            </a:r>
+          </a:p>
+          <a:p>
+            <a:pPr lvl="1"/>
+            <a:endParaRPr lang="en-US" dirty="0"/>
+          </a:p>
           <a:p>
             <a:endParaRPr lang="en-US" dirty="0"/>
           </a:p>
@@ -6750,7 +6825,10 @@
           <a:bodyPr/>
           <a:lstStyle/>
           <a:p>
-            <a:endParaRPr lang="en-US"/>
+            <a:r>
+              <a:rPr lang="en-US" dirty="0"/>
+              <a:t>How detailed is provider data?</a:t>
+            </a:r>
           </a:p>
         </p:txBody>
       </p:sp>
@@ -6766,9 +6844,57 @@
         </p:nvSpPr>
         <p:spPr/>
         <p:txBody>
-          <a:bodyPr/>
-          <a:lstStyle/>
-          <a:p>
+          <a:bodyPr>
+            <a:normAutofit lnSpcReduction="10000"/>
+          </a:bodyPr>
+          <a:lstStyle/>
+          <a:p>
+            <a:r>
+              <a:rPr lang="en-US" dirty="0"/>
+              <a:t>A single doctors can:</a:t>
+            </a:r>
+          </a:p>
+          <a:p>
+            <a:pPr lvl="1"/>
+            <a:r>
+              <a:rPr lang="en-US" dirty="0"/>
+              <a:t>work for multiple organizations,</a:t>
+            </a:r>
+          </a:p>
+          <a:p>
+            <a:pPr lvl="1"/>
+            <a:r>
+              <a:rPr lang="en-US" dirty="0"/>
+              <a:t> at multiple locations,</a:t>
+            </a:r>
+          </a:p>
+          <a:p>
+            <a:pPr lvl="1"/>
+            <a:r>
+              <a:rPr lang="en-US" dirty="0"/>
+              <a:t>During  different time periods.</a:t>
+            </a:r>
+          </a:p>
+          <a:p>
+            <a:r>
+              <a:rPr lang="en-US" dirty="0"/>
+              <a:t>So one person/organization may have multiple rows in the provider data.</a:t>
+            </a:r>
+          </a:p>
+          <a:p>
+            <a:r>
+              <a:rPr lang="en-US" dirty="0"/>
+              <a:t>Each row represents a unique combination or person, affiliation, location and time.</a:t>
+            </a:r>
+          </a:p>
+          <a:p>
+            <a:r>
+              <a:rPr lang="en-US" dirty="0"/>
+              <a:t>Each row is assigned a unique “Provider ID”.  </a:t>
+            </a:r>
+          </a:p>
+          <a:p>
+            <a:pPr lvl="1"/>
             <a:endParaRPr lang="en-US" dirty="0"/>
           </a:p>
         </p:txBody>
@@ -6818,7 +6944,10 @@
           <a:bodyPr/>
           <a:lstStyle/>
           <a:p>
-            <a:endParaRPr lang="en-US"/>
+            <a:r>
+              <a:rPr lang="en-US" dirty="0"/>
+              <a:t>How is a provider identified?</a:t>
+            </a:r>
           </a:p>
         </p:txBody>
       </p:sp>
@@ -6837,7 +6966,52 @@
           <a:bodyPr/>
           <a:lstStyle/>
           <a:p>
-            <a:endParaRPr lang="en-US" dirty="0"/>
+            <a:r>
+              <a:rPr lang="en-US" dirty="0"/>
+              <a:t>The APCD contains multiple fields related to the provider’s identity:</a:t>
+            </a:r>
+          </a:p>
+          <a:p>
+            <a:pPr lvl="1"/>
+            <a:r>
+              <a:rPr lang="en-US" dirty="0"/>
+              <a:t>Tax ID: Social Security number or Federal Employer ID number.</a:t>
+            </a:r>
+          </a:p>
+          <a:p>
+            <a:pPr lvl="1"/>
+            <a:r>
+              <a:rPr lang="en-US" dirty="0"/>
+              <a:t>UPIN: Unique Physician Identification Number, assigned by the Medicare program.</a:t>
+            </a:r>
+          </a:p>
+          <a:p>
+            <a:pPr lvl="1"/>
+            <a:r>
+              <a:rPr lang="en-US" dirty="0"/>
+              <a:t>DEA Number: Number assigned by the Drug Enforcement Agency.</a:t>
+            </a:r>
+          </a:p>
+          <a:p>
+            <a:pPr lvl="1"/>
+            <a:r>
+              <a:rPr lang="en-US" dirty="0"/>
+              <a:t>License ID: The providers state license ID number.</a:t>
+            </a:r>
+          </a:p>
+          <a:p>
+            <a:pPr lvl="1"/>
+            <a:r>
+              <a:rPr lang="en-US" dirty="0"/>
+              <a:t>Registered Provider Organization ID: Unique Identifier assigned by the Massachusetts Health Policy Commission.</a:t>
+            </a:r>
+          </a:p>
+          <a:p>
+            <a:pPr lvl="1"/>
+            <a:r>
+              <a:rPr lang="en-US" dirty="0"/>
+              <a:t>NPI: The National Provider Identification number.</a:t>
+            </a:r>
           </a:p>
         </p:txBody>
       </p:sp>
@@ -6886,7 +7060,10 @@
           <a:bodyPr/>
           <a:lstStyle/>
           <a:p>
-            <a:endParaRPr lang="en-US"/>
+            <a:r>
+              <a:rPr lang="en-US" dirty="0"/>
+              <a:t>Provider Organizations</a:t>
+            </a:r>
           </a:p>
         </p:txBody>
       </p:sp>
@@ -6905,7 +7082,28 @@
           <a:bodyPr/>
           <a:lstStyle/>
           <a:p>
-            <a:endParaRPr lang="en-US" dirty="0"/>
+            <a:r>
+              <a:rPr lang="en-US" dirty="0"/>
+              <a:t>Provider often work at facilities, in professional groups, at retail sites, or for other types of entities.</a:t>
+            </a:r>
+          </a:p>
+          <a:p>
+            <a:r>
+              <a:rPr lang="en-US" dirty="0"/>
+              <a:t>The “Provider ID Code” data element identifies the type of organization represented by a row in the provider data.</a:t>
+            </a:r>
+          </a:p>
+          <a:p>
+            <a:r>
+              <a:rPr lang="en-US" dirty="0"/>
+              <a:t>The “Provider Affiliation” field identifies a provider’s parent organization.</a:t>
+            </a:r>
+          </a:p>
+          <a:p>
+            <a:r>
+              <a:rPr lang="en-US" dirty="0"/>
+              <a:t>Organizational hierarchies can be created using this “Provider Affiliation” field.</a:t>
+            </a:r>
           </a:p>
         </p:txBody>
       </p:sp>
@@ -6954,7 +7152,10 @@
           <a:bodyPr/>
           <a:lstStyle/>
           <a:p>
-            <a:endParaRPr lang="en-US"/>
+            <a:r>
+              <a:rPr lang="en-US" dirty="0"/>
+              <a:t>Why do we need provider data?</a:t>
+            </a:r>
           </a:p>
         </p:txBody>
       </p:sp>
@@ -6973,7 +7174,53 @@
           <a:bodyPr/>
           <a:lstStyle/>
           <a:p>
-            <a:endParaRPr lang="en-US" dirty="0"/>
+            <a:r>
+              <a:rPr lang="en-US" dirty="0"/>
+              <a:t>Allows researchers to answer questions like:</a:t>
+            </a:r>
+          </a:p>
+          <a:p>
+            <a:pPr lvl="1"/>
+            <a:r>
+              <a:rPr lang="en-US" dirty="0"/>
+              <a:t>Which providers offer the highest quality care?</a:t>
+            </a:r>
+          </a:p>
+          <a:p>
+            <a:pPr lvl="1"/>
+            <a:r>
+              <a:rPr lang="en-US" dirty="0"/>
+              <a:t>Did a recent hospital merger lead to higher costs at one of the hospitals?</a:t>
+            </a:r>
+          </a:p>
+          <a:p>
+            <a:pPr lvl="1"/>
+            <a:r>
+              <a:rPr lang="en-US" dirty="0"/>
+              <a:t>Are there providers who are significantly over-</a:t>
+            </a:r>
+            <a:r>
+              <a:rPr lang="en-US" dirty="0" err="1"/>
+              <a:t>utilizating</a:t>
+            </a:r>
+            <a:r>
+              <a:rPr lang="en-US" dirty="0"/>
+              <a:t> certain procedures, medications, etc.?</a:t>
+            </a:r>
+          </a:p>
+          <a:p>
+            <a:pPr lvl="1"/>
+            <a:r>
+              <a:rPr lang="en-US" dirty="0"/>
+              <a:t>Are there geographic regions that do not have some specialists available?</a:t>
+            </a:r>
+          </a:p>
+          <a:p>
+            <a:pPr lvl="1"/>
+            <a:r>
+              <a:rPr lang="en-US" dirty="0"/>
+              <a:t>How do HMO doctors compare to fee-for-service doctors?</a:t>
+            </a:r>
           </a:p>
         </p:txBody>
       </p:sp>
@@ -7023,10 +7270,9 @@
           <a:lstStyle/>
           <a:p>
             <a:r>
-              <a:rPr lang="en-US" dirty="0" smtClean="0"/>
+              <a:rPr lang="en-US" dirty="0"/>
               <a:t>References</a:t>
             </a:r>
-            <a:endParaRPr lang="en-US" dirty="0"/>
           </a:p>
         </p:txBody>
       </p:sp>
@@ -7045,6 +7291,24 @@
           <a:bodyPr/>
           <a:lstStyle/>
           <a:p>
+            <a:r>
+              <a:rPr lang="en-US">
+                <a:hlinkClick r:id="rId2"/>
+              </a:rPr>
+              <a:t>http</a:t>
+            </a:r>
+            <a:r>
+              <a:rPr lang="en-US">
+                <a:hlinkClick r:id="rId2"/>
+              </a:rPr>
+              <a:t>://www.chiamass.gov/assets/docs/p/apcd/submission-guides/version-5.0/v5-apcd-provider-file-submission-guide-FINAL.pdf</a:t>
+            </a:r>
+            <a:endParaRPr lang="en-US"/>
+          </a:p>
+          <a:p>
+            <a:pPr marL="0" indent="0">
+              <a:buNone/>
+            </a:pPr>
             <a:endParaRPr lang="en-US" dirty="0"/>
           </a:p>
         </p:txBody>
@@ -7562,7 +7826,7 @@
   <a:extraClrSchemeLst/>
   <a:extLst>
     <a:ext uri="{05A4C25C-085E-4340-85A3-A5531E510DB2}">
-      <thm15:themeFamily xmlns="" xmlns:thm15="http://schemas.microsoft.com/office/thememl/2012/main" name="Gallery" id="{BBFCD31E-59A1-489D-B089-A3EAD7CAE12E}" vid="{AC464412-510E-4F2B-8947-A0DDBD028997}"/>
+      <thm15:themeFamily xmlns:thm15="http://schemas.microsoft.com/office/thememl/2012/main" name="Gallery" id="{BBFCD31E-59A1-489D-B089-A3EAD7CAE12E}" vid="{AC464412-510E-4F2B-8947-A0DDBD028997}"/>
     </a:ext>
   </a:extLst>
 </a:theme>

</xml_diff>